<commit_message>
Added slide for func1
</commit_message>
<xml_diff>
--- a/ETH_Project 1.pptx
+++ b/ETH_Project 1.pptx
@@ -9,6 +9,7 @@
     <p:sldId id="257" r:id="rId3"/>
     <p:sldId id="258" r:id="rId4"/>
     <p:sldId id="259" r:id="rId5"/>
+    <p:sldId id="260" r:id="rId6"/>
   </p:sldIdLst>
   <p:sldSz cx="12192000" cy="6858000"/>
   <p:notesSz cx="6858000" cy="9144000"/>
@@ -118,9 +119,78 @@
 <file path=ppt/revisionInfo.xml><?xml version="1.0" encoding="utf-8"?>
 <p1510:revInfo xmlns:a="http://schemas.openxmlformats.org/drawingml/2006/main" xmlns:r="http://schemas.openxmlformats.org/officeDocument/2006/relationships" xmlns:p1510="http://schemas.microsoft.com/office/powerpoint/2015/10/main">
   <p1510:revLst>
-    <p1510:client id="{1B1415DE-6DB9-4335-8BFD-FF8619941439}" v="19" dt="2023-12-12T13:39:01.041"/>
+    <p1510:client id="{B80EAAFD-2A40-4B96-9983-E6508BCC74ED}" v="8" dt="2024-01-10T17:50:56.700"/>
   </p1510:revLst>
 </p1510:revInfo>
+</file>
+
+<file path=ppt/changesInfos/changesInfo1.xml><?xml version="1.0" encoding="utf-8"?>
+<pc:chgInfo xmlns:a="http://schemas.openxmlformats.org/drawingml/2006/main" xmlns:r="http://schemas.openxmlformats.org/officeDocument/2006/relationships" xmlns:ac="http://schemas.microsoft.com/office/drawing/2013/main/command" xmlns:pc="http://schemas.microsoft.com/office/powerpoint/2013/main/command">
+  <pc:docChgLst>
+    <pc:chgData name="Prateek Shekhar" userId="02bf5c052f0ff66a" providerId="LiveId" clId="{B80EAAFD-2A40-4B96-9983-E6508BCC74ED}"/>
+    <pc:docChg chg="custSel addSld modSld">
+      <pc:chgData name="Prateek Shekhar" userId="02bf5c052f0ff66a" providerId="LiveId" clId="{B80EAAFD-2A40-4B96-9983-E6508BCC74ED}" dt="2024-01-10T17:51:11.046" v="229" actId="20577"/>
+      <pc:docMkLst>
+        <pc:docMk/>
+      </pc:docMkLst>
+      <pc:sldChg chg="addSp delSp modSp new mod">
+        <pc:chgData name="Prateek Shekhar" userId="02bf5c052f0ff66a" providerId="LiveId" clId="{B80EAAFD-2A40-4B96-9983-E6508BCC74ED}" dt="2024-01-10T17:51:11.046" v="229" actId="20577"/>
+        <pc:sldMkLst>
+          <pc:docMk/>
+          <pc:sldMk cId="2460480122" sldId="260"/>
+        </pc:sldMkLst>
+        <pc:spChg chg="del">
+          <ac:chgData name="Prateek Shekhar" userId="02bf5c052f0ff66a" providerId="LiveId" clId="{B80EAAFD-2A40-4B96-9983-E6508BCC74ED}" dt="2024-01-10T17:47:15.660" v="1" actId="3680"/>
+          <ac:spMkLst>
+            <pc:docMk/>
+            <pc:sldMk cId="2460480122" sldId="260"/>
+            <ac:spMk id="3" creationId="{21902962-8FCE-3E81-23FF-B693C10ED172}"/>
+          </ac:spMkLst>
+        </pc:spChg>
+        <pc:spChg chg="add del mod">
+          <ac:chgData name="Prateek Shekhar" userId="02bf5c052f0ff66a" providerId="LiveId" clId="{B80EAAFD-2A40-4B96-9983-E6508BCC74ED}" dt="2024-01-10T17:48:37.326" v="11" actId="478"/>
+          <ac:spMkLst>
+            <pc:docMk/>
+            <pc:sldMk cId="2460480122" sldId="260"/>
+            <ac:spMk id="7" creationId="{C9C66178-DDAC-2192-984A-4439A188C457}"/>
+          </ac:spMkLst>
+        </pc:spChg>
+        <pc:spChg chg="add del mod">
+          <ac:chgData name="Prateek Shekhar" userId="02bf5c052f0ff66a" providerId="LiveId" clId="{B80EAAFD-2A40-4B96-9983-E6508BCC74ED}" dt="2024-01-10T17:48:40.892" v="12" actId="478"/>
+          <ac:spMkLst>
+            <pc:docMk/>
+            <pc:sldMk cId="2460480122" sldId="260"/>
+            <ac:spMk id="9" creationId="{445D27D2-67F9-5297-A75C-168C44D0840F}"/>
+          </ac:spMkLst>
+        </pc:spChg>
+        <pc:graphicFrameChg chg="add del mod ord modGraphic">
+          <ac:chgData name="Prateek Shekhar" userId="02bf5c052f0ff66a" providerId="LiveId" clId="{B80EAAFD-2A40-4B96-9983-E6508BCC74ED}" dt="2024-01-10T17:48:24.763" v="7" actId="21"/>
+          <ac:graphicFrameMkLst>
+            <pc:docMk/>
+            <pc:sldMk cId="2460480122" sldId="260"/>
+            <ac:graphicFrameMk id="4" creationId="{4D3984E6-50B3-A00E-2FF6-E79292697A97}"/>
+          </ac:graphicFrameMkLst>
+        </pc:graphicFrameChg>
+        <pc:graphicFrameChg chg="add mod modGraphic">
+          <ac:chgData name="Prateek Shekhar" userId="02bf5c052f0ff66a" providerId="LiveId" clId="{B80EAAFD-2A40-4B96-9983-E6508BCC74ED}" dt="2024-01-10T17:50:53.963" v="220" actId="14734"/>
+          <ac:graphicFrameMkLst>
+            <pc:docMk/>
+            <pc:sldMk cId="2460480122" sldId="260"/>
+            <ac:graphicFrameMk id="5" creationId="{AD5BFF5A-CE3D-94E8-237E-8303C9CFCA88}"/>
+          </ac:graphicFrameMkLst>
+        </pc:graphicFrameChg>
+        <pc:graphicFrameChg chg="add mod modGraphic">
+          <ac:chgData name="Prateek Shekhar" userId="02bf5c052f0ff66a" providerId="LiveId" clId="{B80EAAFD-2A40-4B96-9983-E6508BCC74ED}" dt="2024-01-10T17:51:11.046" v="229" actId="20577"/>
+          <ac:graphicFrameMkLst>
+            <pc:docMk/>
+            <pc:sldMk cId="2460480122" sldId="260"/>
+            <ac:graphicFrameMk id="10" creationId="{367642DB-75DE-B4F0-F54B-27B01A102767}"/>
+          </ac:graphicFrameMkLst>
+        </pc:graphicFrameChg>
+      </pc:sldChg>
+    </pc:docChg>
+  </pc:docChgLst>
+</pc:chgInfo>
 </file>
 
 <file path=ppt/slideLayouts/slideLayout1.xml><?xml version="1.0" encoding="utf-8"?>
@@ -272,7 +342,7 @@
           <a:p>
             <a:fld id="{6EAEE6A6-CED2-46BC-AD70-1FD03213DDC0}" type="datetimeFigureOut">
               <a:rPr lang="en-AE" smtClean="0"/>
-              <a:t>09/01/2024</a:t>
+              <a:t>10/01/2024</a:t>
             </a:fld>
             <a:endParaRPr lang="en-AE"/>
           </a:p>
@@ -472,7 +542,7 @@
           <a:p>
             <a:fld id="{6EAEE6A6-CED2-46BC-AD70-1FD03213DDC0}" type="datetimeFigureOut">
               <a:rPr lang="en-AE" smtClean="0"/>
-              <a:t>09/01/2024</a:t>
+              <a:t>10/01/2024</a:t>
             </a:fld>
             <a:endParaRPr lang="en-AE"/>
           </a:p>
@@ -682,7 +752,7 @@
           <a:p>
             <a:fld id="{6EAEE6A6-CED2-46BC-AD70-1FD03213DDC0}" type="datetimeFigureOut">
               <a:rPr lang="en-AE" smtClean="0"/>
-              <a:t>09/01/2024</a:t>
+              <a:t>10/01/2024</a:t>
             </a:fld>
             <a:endParaRPr lang="en-AE"/>
           </a:p>
@@ -882,7 +952,7 @@
           <a:p>
             <a:fld id="{6EAEE6A6-CED2-46BC-AD70-1FD03213DDC0}" type="datetimeFigureOut">
               <a:rPr lang="en-AE" smtClean="0"/>
-              <a:t>09/01/2024</a:t>
+              <a:t>10/01/2024</a:t>
             </a:fld>
             <a:endParaRPr lang="en-AE"/>
           </a:p>
@@ -1158,7 +1228,7 @@
           <a:p>
             <a:fld id="{6EAEE6A6-CED2-46BC-AD70-1FD03213DDC0}" type="datetimeFigureOut">
               <a:rPr lang="en-AE" smtClean="0"/>
-              <a:t>09/01/2024</a:t>
+              <a:t>10/01/2024</a:t>
             </a:fld>
             <a:endParaRPr lang="en-AE"/>
           </a:p>
@@ -1426,7 +1496,7 @@
           <a:p>
             <a:fld id="{6EAEE6A6-CED2-46BC-AD70-1FD03213DDC0}" type="datetimeFigureOut">
               <a:rPr lang="en-AE" smtClean="0"/>
-              <a:t>09/01/2024</a:t>
+              <a:t>10/01/2024</a:t>
             </a:fld>
             <a:endParaRPr lang="en-AE"/>
           </a:p>
@@ -1841,7 +1911,7 @@
           <a:p>
             <a:fld id="{6EAEE6A6-CED2-46BC-AD70-1FD03213DDC0}" type="datetimeFigureOut">
               <a:rPr lang="en-AE" smtClean="0"/>
-              <a:t>09/01/2024</a:t>
+              <a:t>10/01/2024</a:t>
             </a:fld>
             <a:endParaRPr lang="en-AE"/>
           </a:p>
@@ -1983,7 +2053,7 @@
           <a:p>
             <a:fld id="{6EAEE6A6-CED2-46BC-AD70-1FD03213DDC0}" type="datetimeFigureOut">
               <a:rPr lang="en-AE" smtClean="0"/>
-              <a:t>09/01/2024</a:t>
+              <a:t>10/01/2024</a:t>
             </a:fld>
             <a:endParaRPr lang="en-AE"/>
           </a:p>
@@ -2096,7 +2166,7 @@
           <a:p>
             <a:fld id="{6EAEE6A6-CED2-46BC-AD70-1FD03213DDC0}" type="datetimeFigureOut">
               <a:rPr lang="en-AE" smtClean="0"/>
-              <a:t>09/01/2024</a:t>
+              <a:t>10/01/2024</a:t>
             </a:fld>
             <a:endParaRPr lang="en-AE"/>
           </a:p>
@@ -2409,7 +2479,7 @@
           <a:p>
             <a:fld id="{6EAEE6A6-CED2-46BC-AD70-1FD03213DDC0}" type="datetimeFigureOut">
               <a:rPr lang="en-AE" smtClean="0"/>
-              <a:t>09/01/2024</a:t>
+              <a:t>10/01/2024</a:t>
             </a:fld>
             <a:endParaRPr lang="en-AE"/>
           </a:p>
@@ -2698,7 +2768,7 @@
           <a:p>
             <a:fld id="{6EAEE6A6-CED2-46BC-AD70-1FD03213DDC0}" type="datetimeFigureOut">
               <a:rPr lang="en-AE" smtClean="0"/>
-              <a:t>09/01/2024</a:t>
+              <a:t>10/01/2024</a:t>
             </a:fld>
             <a:endParaRPr lang="en-AE"/>
           </a:p>
@@ -2941,7 +3011,7 @@
           <a:p>
             <a:fld id="{6EAEE6A6-CED2-46BC-AD70-1FD03213DDC0}" type="datetimeFigureOut">
               <a:rPr lang="en-AE" smtClean="0"/>
-              <a:t>09/01/2024</a:t>
+              <a:t>10/01/2024</a:t>
             </a:fld>
             <a:endParaRPr lang="en-AE"/>
           </a:p>
@@ -6467,6 +6537,1169 @@
 </p:sld>
 </file>
 
+<file path=ppt/slides/slide5.xml><?xml version="1.0" encoding="utf-8"?>
+<p:sld xmlns:a="http://schemas.openxmlformats.org/drawingml/2006/main" xmlns:r="http://schemas.openxmlformats.org/officeDocument/2006/relationships" xmlns:p="http://schemas.openxmlformats.org/presentationml/2006/main">
+  <p:cSld>
+    <p:spTree>
+      <p:nvGrpSpPr>
+        <p:cNvPr id="1" name=""/>
+        <p:cNvGrpSpPr/>
+        <p:nvPr/>
+      </p:nvGrpSpPr>
+      <p:grpSpPr>
+        <a:xfrm>
+          <a:off x="0" y="0"/>
+          <a:ext cx="0" cy="0"/>
+          <a:chOff x="0" y="0"/>
+          <a:chExt cx="0" cy="0"/>
+        </a:xfrm>
+      </p:grpSpPr>
+      <p:sp>
+        <p:nvSpPr>
+          <p:cNvPr id="2" name="Title 1">
+            <a:extLst>
+              <a:ext uri="{FF2B5EF4-FFF2-40B4-BE49-F238E27FC236}">
+                <a16:creationId xmlns:a16="http://schemas.microsoft.com/office/drawing/2014/main" id="{9E6A2315-78E4-E957-9FD2-71D140C3CA5D}"/>
+              </a:ext>
+            </a:extLst>
+          </p:cNvPr>
+          <p:cNvSpPr>
+            <a:spLocks noGrp="1"/>
+          </p:cNvSpPr>
+          <p:nvPr>
+            <p:ph type="title"/>
+          </p:nvPr>
+        </p:nvSpPr>
+        <p:spPr/>
+        <p:txBody>
+          <a:bodyPr/>
+          <a:lstStyle/>
+          <a:p>
+            <a:endParaRPr lang="en-AE"/>
+          </a:p>
+        </p:txBody>
+      </p:sp>
+      <p:graphicFrame>
+        <p:nvGraphicFramePr>
+          <p:cNvPr id="5" name="Table 4">
+            <a:extLst>
+              <a:ext uri="{FF2B5EF4-FFF2-40B4-BE49-F238E27FC236}">
+                <a16:creationId xmlns:a16="http://schemas.microsoft.com/office/drawing/2014/main" id="{AD5BFF5A-CE3D-94E8-237E-8303C9CFCA88}"/>
+              </a:ext>
+            </a:extLst>
+          </p:cNvPr>
+          <p:cNvGraphicFramePr>
+            <a:graphicFrameLocks noGrp="1"/>
+          </p:cNvGraphicFramePr>
+          <p:nvPr>
+            <p:extLst>
+              <p:ext uri="{D42A27DB-BD31-4B8C-83A1-F6EECF244321}">
+                <p14:modId xmlns:p14="http://schemas.microsoft.com/office/powerpoint/2010/main" val="2619936357"/>
+              </p:ext>
+            </p:extLst>
+          </p:nvPr>
+        </p:nvGraphicFramePr>
+        <p:xfrm>
+          <a:off x="475204" y="2438645"/>
+          <a:ext cx="5254264" cy="3474720"/>
+        </p:xfrm>
+        <a:graphic>
+          <a:graphicData uri="http://schemas.openxmlformats.org/drawingml/2006/table">
+            <a:tbl>
+              <a:tblPr firstRow="1" bandRow="1">
+                <a:tableStyleId>{5C22544A-7EE6-4342-B048-85BDC9FD1C3A}</a:tableStyleId>
+              </a:tblPr>
+              <a:tblGrid>
+                <a:gridCol w="1313566">
+                  <a:extLst>
+                    <a:ext uri="{9D8B030D-6E8A-4147-A177-3AD203B41FA5}">
+                      <a16:colId xmlns:a16="http://schemas.microsoft.com/office/drawing/2014/main" val="1123522605"/>
+                    </a:ext>
+                  </a:extLst>
+                </a:gridCol>
+                <a:gridCol w="1313566">
+                  <a:extLst>
+                    <a:ext uri="{9D8B030D-6E8A-4147-A177-3AD203B41FA5}">
+                      <a16:colId xmlns:a16="http://schemas.microsoft.com/office/drawing/2014/main" val="2131324531"/>
+                    </a:ext>
+                  </a:extLst>
+                </a:gridCol>
+                <a:gridCol w="1313566">
+                  <a:extLst>
+                    <a:ext uri="{9D8B030D-6E8A-4147-A177-3AD203B41FA5}">
+                      <a16:colId xmlns:a16="http://schemas.microsoft.com/office/drawing/2014/main" val="3384016430"/>
+                    </a:ext>
+                  </a:extLst>
+                </a:gridCol>
+                <a:gridCol w="1313566">
+                  <a:extLst>
+                    <a:ext uri="{9D8B030D-6E8A-4147-A177-3AD203B41FA5}">
+                      <a16:colId xmlns:a16="http://schemas.microsoft.com/office/drawing/2014/main" val="4227991258"/>
+                    </a:ext>
+                  </a:extLst>
+                </a:gridCol>
+              </a:tblGrid>
+              <a:tr h="356362">
+                <a:tc>
+                  <a:txBody>
+                    <a:bodyPr/>
+                    <a:lstStyle/>
+                    <a:p>
+                      <a:r>
+                        <a:rPr lang="en-US" dirty="0"/>
+                        <a:t>Key/ID</a:t>
+                      </a:r>
+                      <a:endParaRPr lang="en-AE" dirty="0"/>
+                    </a:p>
+                  </a:txBody>
+                  <a:tcPr/>
+                </a:tc>
+                <a:tc>
+                  <a:txBody>
+                    <a:bodyPr/>
+                    <a:lstStyle/>
+                    <a:p>
+                      <a:r>
+                        <a:rPr lang="en-US" dirty="0"/>
+                        <a:t>Restaurant Name</a:t>
+                      </a:r>
+                      <a:endParaRPr lang="en-AE" dirty="0"/>
+                    </a:p>
+                  </a:txBody>
+                  <a:tcPr/>
+                </a:tc>
+                <a:tc>
+                  <a:txBody>
+                    <a:bodyPr/>
+                    <a:lstStyle/>
+                    <a:p>
+                      <a:r>
+                        <a:rPr lang="en-US" dirty="0"/>
+                        <a:t>Street Address</a:t>
+                      </a:r>
+                      <a:endParaRPr lang="en-AE" dirty="0"/>
+                    </a:p>
+                  </a:txBody>
+                  <a:tcPr/>
+                </a:tc>
+                <a:tc>
+                  <a:txBody>
+                    <a:bodyPr/>
+                    <a:lstStyle/>
+                    <a:p>
+                      <a:r>
+                        <a:rPr lang="en-US" dirty="0" err="1"/>
+                        <a:t>GlobalID</a:t>
+                      </a:r>
+                      <a:endParaRPr lang="en-AE" dirty="0"/>
+                    </a:p>
+                  </a:txBody>
+                  <a:tcPr/>
+                </a:tc>
+                <a:extLst>
+                  <a:ext uri="{0D108BD9-81ED-4DB2-BD59-A6C34878D82A}">
+                    <a16:rowId xmlns:a16="http://schemas.microsoft.com/office/drawing/2014/main" val="130945692"/>
+                  </a:ext>
+                </a:extLst>
+              </a:tr>
+              <a:tr h="195858">
+                <a:tc>
+                  <a:txBody>
+                    <a:bodyPr/>
+                    <a:lstStyle/>
+                    <a:p>
+                      <a:r>
+                        <a:rPr lang="en-US" dirty="0"/>
+                        <a:t>XYZ123</a:t>
+                      </a:r>
+                      <a:endParaRPr lang="en-AE" dirty="0"/>
+                    </a:p>
+                  </a:txBody>
+                  <a:tcPr/>
+                </a:tc>
+                <a:tc>
+                  <a:txBody>
+                    <a:bodyPr/>
+                    <a:lstStyle/>
+                    <a:p>
+                      <a:r>
+                        <a:rPr lang="en-US" dirty="0" err="1"/>
+                        <a:t>McD</a:t>
+                      </a:r>
+                      <a:endParaRPr lang="en-AE" dirty="0"/>
+                    </a:p>
+                  </a:txBody>
+                  <a:tcPr/>
+                </a:tc>
+                <a:tc>
+                  <a:txBody>
+                    <a:bodyPr/>
+                    <a:lstStyle/>
+                    <a:p>
+                      <a:r>
+                        <a:rPr lang="en-US" dirty="0"/>
+                        <a:t>1 Street</a:t>
+                      </a:r>
+                      <a:endParaRPr lang="en-AE" dirty="0"/>
+                    </a:p>
+                  </a:txBody>
+                  <a:tcPr/>
+                </a:tc>
+                <a:tc>
+                  <a:txBody>
+                    <a:bodyPr/>
+                    <a:lstStyle/>
+                    <a:p>
+                      <a:endParaRPr lang="en-AE"/>
+                    </a:p>
+                  </a:txBody>
+                  <a:tcPr/>
+                </a:tc>
+                <a:extLst>
+                  <a:ext uri="{0D108BD9-81ED-4DB2-BD59-A6C34878D82A}">
+                    <a16:rowId xmlns:a16="http://schemas.microsoft.com/office/drawing/2014/main" val="3550150490"/>
+                  </a:ext>
+                </a:extLst>
+              </a:tr>
+              <a:tr h="342751">
+                <a:tc>
+                  <a:txBody>
+                    <a:bodyPr/>
+                    <a:lstStyle/>
+                    <a:p>
+                      <a:r>
+                        <a:rPr lang="en-US" dirty="0"/>
+                        <a:t>XYZ124</a:t>
+                      </a:r>
+                      <a:endParaRPr lang="en-AE" dirty="0"/>
+                    </a:p>
+                  </a:txBody>
+                  <a:tcPr/>
+                </a:tc>
+                <a:tc>
+                  <a:txBody>
+                    <a:bodyPr/>
+                    <a:lstStyle/>
+                    <a:p>
+                      <a:r>
+                        <a:rPr lang="en-US" dirty="0"/>
+                        <a:t>Saucepan</a:t>
+                      </a:r>
+                      <a:endParaRPr lang="en-AE" dirty="0"/>
+                    </a:p>
+                  </a:txBody>
+                  <a:tcPr/>
+                </a:tc>
+                <a:tc>
+                  <a:txBody>
+                    <a:bodyPr/>
+                    <a:lstStyle/>
+                    <a:p>
+                      <a:r>
+                        <a:rPr lang="en-US" dirty="0"/>
+                        <a:t>1 Street</a:t>
+                      </a:r>
+                      <a:endParaRPr lang="en-AE" dirty="0"/>
+                    </a:p>
+                  </a:txBody>
+                  <a:tcPr/>
+                </a:tc>
+                <a:tc>
+                  <a:txBody>
+                    <a:bodyPr/>
+                    <a:lstStyle/>
+                    <a:p>
+                      <a:endParaRPr lang="en-AE"/>
+                    </a:p>
+                  </a:txBody>
+                  <a:tcPr/>
+                </a:tc>
+                <a:extLst>
+                  <a:ext uri="{0D108BD9-81ED-4DB2-BD59-A6C34878D82A}">
+                    <a16:rowId xmlns:a16="http://schemas.microsoft.com/office/drawing/2014/main" val="2075380803"/>
+                  </a:ext>
+                </a:extLst>
+              </a:tr>
+              <a:tr h="195858">
+                <a:tc>
+                  <a:txBody>
+                    <a:bodyPr/>
+                    <a:lstStyle/>
+                    <a:p>
+                      <a:r>
+                        <a:rPr lang="en-US" dirty="0"/>
+                        <a:t>XYZ123</a:t>
+                      </a:r>
+                      <a:endParaRPr lang="en-AE" dirty="0"/>
+                    </a:p>
+                  </a:txBody>
+                  <a:tcPr/>
+                </a:tc>
+                <a:tc>
+                  <a:txBody>
+                    <a:bodyPr/>
+                    <a:lstStyle/>
+                    <a:p>
+                      <a:r>
+                        <a:rPr lang="en-US" dirty="0" err="1"/>
+                        <a:t>McD</a:t>
+                      </a:r>
+                      <a:endParaRPr lang="en-AE" dirty="0"/>
+                    </a:p>
+                  </a:txBody>
+                  <a:tcPr/>
+                </a:tc>
+                <a:tc>
+                  <a:txBody>
+                    <a:bodyPr/>
+                    <a:lstStyle/>
+                    <a:p>
+                      <a:r>
+                        <a:rPr lang="en-US" dirty="0"/>
+                        <a:t>1 Street</a:t>
+                      </a:r>
+                      <a:endParaRPr lang="en-AE" dirty="0"/>
+                    </a:p>
+                  </a:txBody>
+                  <a:tcPr/>
+                </a:tc>
+                <a:tc>
+                  <a:txBody>
+                    <a:bodyPr/>
+                    <a:lstStyle/>
+                    <a:p>
+                      <a:endParaRPr lang="en-AE" dirty="0"/>
+                    </a:p>
+                  </a:txBody>
+                  <a:tcPr/>
+                </a:tc>
+                <a:extLst>
+                  <a:ext uri="{0D108BD9-81ED-4DB2-BD59-A6C34878D82A}">
+                    <a16:rowId xmlns:a16="http://schemas.microsoft.com/office/drawing/2014/main" val="1175958155"/>
+                  </a:ext>
+                </a:extLst>
+              </a:tr>
+              <a:tr h="342751">
+                <a:tc>
+                  <a:txBody>
+                    <a:bodyPr/>
+                    <a:lstStyle/>
+                    <a:p>
+                      <a:r>
+                        <a:rPr lang="en-US" dirty="0"/>
+                        <a:t>XYZ126</a:t>
+                      </a:r>
+                      <a:endParaRPr lang="en-AE" dirty="0"/>
+                    </a:p>
+                  </a:txBody>
+                  <a:tcPr/>
+                </a:tc>
+                <a:tc>
+                  <a:txBody>
+                    <a:bodyPr/>
+                    <a:lstStyle/>
+                    <a:p>
+                      <a:r>
+                        <a:rPr lang="en-US" dirty="0" err="1"/>
+                        <a:t>Goodeats</a:t>
+                      </a:r>
+                      <a:endParaRPr lang="en-AE" dirty="0"/>
+                    </a:p>
+                  </a:txBody>
+                  <a:tcPr/>
+                </a:tc>
+                <a:tc>
+                  <a:txBody>
+                    <a:bodyPr/>
+                    <a:lstStyle/>
+                    <a:p>
+                      <a:r>
+                        <a:rPr lang="en-US" dirty="0"/>
+                        <a:t>2 Street</a:t>
+                      </a:r>
+                      <a:endParaRPr lang="en-AE" dirty="0"/>
+                    </a:p>
+                  </a:txBody>
+                  <a:tcPr/>
+                </a:tc>
+                <a:tc>
+                  <a:txBody>
+                    <a:bodyPr/>
+                    <a:lstStyle/>
+                    <a:p>
+                      <a:endParaRPr lang="en-AE"/>
+                    </a:p>
+                  </a:txBody>
+                  <a:tcPr/>
+                </a:tc>
+                <a:extLst>
+                  <a:ext uri="{0D108BD9-81ED-4DB2-BD59-A6C34878D82A}">
+                    <a16:rowId xmlns:a16="http://schemas.microsoft.com/office/drawing/2014/main" val="3316805304"/>
+                  </a:ext>
+                </a:extLst>
+              </a:tr>
+              <a:tr h="342751">
+                <a:tc>
+                  <a:txBody>
+                    <a:bodyPr/>
+                    <a:lstStyle/>
+                    <a:p>
+                      <a:r>
+                        <a:rPr lang="en-US" dirty="0"/>
+                        <a:t>XYZ127</a:t>
+                      </a:r>
+                      <a:endParaRPr lang="en-AE" dirty="0"/>
+                    </a:p>
+                  </a:txBody>
+                  <a:tcPr/>
+                </a:tc>
+                <a:tc>
+                  <a:txBody>
+                    <a:bodyPr/>
+                    <a:lstStyle/>
+                    <a:p>
+                      <a:r>
+                        <a:rPr lang="en-US" dirty="0"/>
+                        <a:t>Chinese Hut</a:t>
+                      </a:r>
+                      <a:endParaRPr lang="en-AE" dirty="0"/>
+                    </a:p>
+                  </a:txBody>
+                  <a:tcPr/>
+                </a:tc>
+                <a:tc>
+                  <a:txBody>
+                    <a:bodyPr/>
+                    <a:lstStyle/>
+                    <a:p>
+                      <a:r>
+                        <a:rPr lang="en-US" dirty="0"/>
+                        <a:t>3 Street</a:t>
+                      </a:r>
+                      <a:endParaRPr lang="en-AE" dirty="0"/>
+                    </a:p>
+                  </a:txBody>
+                  <a:tcPr/>
+                </a:tc>
+                <a:tc>
+                  <a:txBody>
+                    <a:bodyPr/>
+                    <a:lstStyle/>
+                    <a:p>
+                      <a:endParaRPr lang="en-AE"/>
+                    </a:p>
+                  </a:txBody>
+                  <a:tcPr/>
+                </a:tc>
+                <a:extLst>
+                  <a:ext uri="{0D108BD9-81ED-4DB2-BD59-A6C34878D82A}">
+                    <a16:rowId xmlns:a16="http://schemas.microsoft.com/office/drawing/2014/main" val="3100583042"/>
+                  </a:ext>
+                </a:extLst>
+              </a:tr>
+              <a:tr h="342751">
+                <a:tc>
+                  <a:txBody>
+                    <a:bodyPr/>
+                    <a:lstStyle/>
+                    <a:p>
+                      <a:r>
+                        <a:rPr lang="en-US" dirty="0"/>
+                        <a:t>XYZ128</a:t>
+                      </a:r>
+                      <a:endParaRPr lang="en-AE" dirty="0"/>
+                    </a:p>
+                  </a:txBody>
+                  <a:tcPr/>
+                </a:tc>
+                <a:tc>
+                  <a:txBody>
+                    <a:bodyPr/>
+                    <a:lstStyle/>
+                    <a:p>
+                      <a:r>
+                        <a:rPr lang="en-US" dirty="0"/>
+                        <a:t>Pizza Heaven</a:t>
+                      </a:r>
+                      <a:endParaRPr lang="en-AE" dirty="0"/>
+                    </a:p>
+                  </a:txBody>
+                  <a:tcPr/>
+                </a:tc>
+                <a:tc>
+                  <a:txBody>
+                    <a:bodyPr/>
+                    <a:lstStyle/>
+                    <a:p>
+                      <a:r>
+                        <a:rPr lang="en-US" dirty="0"/>
+                        <a:t>2 Street</a:t>
+                      </a:r>
+                      <a:endParaRPr lang="en-AE" dirty="0"/>
+                    </a:p>
+                  </a:txBody>
+                  <a:tcPr/>
+                </a:tc>
+                <a:tc>
+                  <a:txBody>
+                    <a:bodyPr/>
+                    <a:lstStyle/>
+                    <a:p>
+                      <a:endParaRPr lang="en-AE"/>
+                    </a:p>
+                  </a:txBody>
+                  <a:tcPr/>
+                </a:tc>
+                <a:extLst>
+                  <a:ext uri="{0D108BD9-81ED-4DB2-BD59-A6C34878D82A}">
+                    <a16:rowId xmlns:a16="http://schemas.microsoft.com/office/drawing/2014/main" val="1433070935"/>
+                  </a:ext>
+                </a:extLst>
+              </a:tr>
+              <a:tr h="195858">
+                <a:tc>
+                  <a:txBody>
+                    <a:bodyPr/>
+                    <a:lstStyle/>
+                    <a:p>
+                      <a:r>
+                        <a:rPr lang="en-US" dirty="0"/>
+                        <a:t>XYZ123</a:t>
+                      </a:r>
+                      <a:endParaRPr lang="en-AE" dirty="0"/>
+                    </a:p>
+                  </a:txBody>
+                  <a:tcPr/>
+                </a:tc>
+                <a:tc>
+                  <a:txBody>
+                    <a:bodyPr/>
+                    <a:lstStyle/>
+                    <a:p>
+                      <a:r>
+                        <a:rPr lang="en-US" dirty="0" err="1"/>
+                        <a:t>McD</a:t>
+                      </a:r>
+                      <a:endParaRPr lang="en-AE" dirty="0"/>
+                    </a:p>
+                  </a:txBody>
+                  <a:tcPr/>
+                </a:tc>
+                <a:tc>
+                  <a:txBody>
+                    <a:bodyPr/>
+                    <a:lstStyle/>
+                    <a:p>
+                      <a:r>
+                        <a:rPr lang="en-US" dirty="0"/>
+                        <a:t>1 Street</a:t>
+                      </a:r>
+                      <a:endParaRPr lang="en-AE" dirty="0"/>
+                    </a:p>
+                  </a:txBody>
+                  <a:tcPr/>
+                </a:tc>
+                <a:tc>
+                  <a:txBody>
+                    <a:bodyPr/>
+                    <a:lstStyle/>
+                    <a:p>
+                      <a:endParaRPr lang="en-AE" dirty="0"/>
+                    </a:p>
+                  </a:txBody>
+                  <a:tcPr/>
+                </a:tc>
+                <a:extLst>
+                  <a:ext uri="{0D108BD9-81ED-4DB2-BD59-A6C34878D82A}">
+                    <a16:rowId xmlns:a16="http://schemas.microsoft.com/office/drawing/2014/main" val="1974913840"/>
+                  </a:ext>
+                </a:extLst>
+              </a:tr>
+            </a:tbl>
+          </a:graphicData>
+        </a:graphic>
+      </p:graphicFrame>
+      <p:graphicFrame>
+        <p:nvGraphicFramePr>
+          <p:cNvPr id="10" name="Table 9">
+            <a:extLst>
+              <a:ext uri="{FF2B5EF4-FFF2-40B4-BE49-F238E27FC236}">
+                <a16:creationId xmlns:a16="http://schemas.microsoft.com/office/drawing/2014/main" id="{367642DB-75DE-B4F0-F54B-27B01A102767}"/>
+              </a:ext>
+            </a:extLst>
+          </p:cNvPr>
+          <p:cNvGraphicFramePr>
+            <a:graphicFrameLocks noGrp="1"/>
+          </p:cNvGraphicFramePr>
+          <p:nvPr>
+            <p:extLst>
+              <p:ext uri="{D42A27DB-BD31-4B8C-83A1-F6EECF244321}">
+                <p14:modId xmlns:p14="http://schemas.microsoft.com/office/powerpoint/2010/main" val="645255478"/>
+              </p:ext>
+            </p:extLst>
+          </p:nvPr>
+        </p:nvGraphicFramePr>
+        <p:xfrm>
+          <a:off x="6374435" y="2438645"/>
+          <a:ext cx="5254264" cy="3474720"/>
+        </p:xfrm>
+        <a:graphic>
+          <a:graphicData uri="http://schemas.openxmlformats.org/drawingml/2006/table">
+            <a:tbl>
+              <a:tblPr firstRow="1" bandRow="1">
+                <a:tableStyleId>{5C22544A-7EE6-4342-B048-85BDC9FD1C3A}</a:tableStyleId>
+              </a:tblPr>
+              <a:tblGrid>
+                <a:gridCol w="1313566">
+                  <a:extLst>
+                    <a:ext uri="{9D8B030D-6E8A-4147-A177-3AD203B41FA5}">
+                      <a16:colId xmlns:a16="http://schemas.microsoft.com/office/drawing/2014/main" val="1123522605"/>
+                    </a:ext>
+                  </a:extLst>
+                </a:gridCol>
+                <a:gridCol w="1313566">
+                  <a:extLst>
+                    <a:ext uri="{9D8B030D-6E8A-4147-A177-3AD203B41FA5}">
+                      <a16:colId xmlns:a16="http://schemas.microsoft.com/office/drawing/2014/main" val="2131324531"/>
+                    </a:ext>
+                  </a:extLst>
+                </a:gridCol>
+                <a:gridCol w="1313566">
+                  <a:extLst>
+                    <a:ext uri="{9D8B030D-6E8A-4147-A177-3AD203B41FA5}">
+                      <a16:colId xmlns:a16="http://schemas.microsoft.com/office/drawing/2014/main" val="3384016430"/>
+                    </a:ext>
+                  </a:extLst>
+                </a:gridCol>
+                <a:gridCol w="1313566">
+                  <a:extLst>
+                    <a:ext uri="{9D8B030D-6E8A-4147-A177-3AD203B41FA5}">
+                      <a16:colId xmlns:a16="http://schemas.microsoft.com/office/drawing/2014/main" val="4227991258"/>
+                    </a:ext>
+                  </a:extLst>
+                </a:gridCol>
+              </a:tblGrid>
+              <a:tr h="356362">
+                <a:tc>
+                  <a:txBody>
+                    <a:bodyPr/>
+                    <a:lstStyle/>
+                    <a:p>
+                      <a:r>
+                        <a:rPr lang="en-US" dirty="0"/>
+                        <a:t>Key/ID</a:t>
+                      </a:r>
+                      <a:endParaRPr lang="en-AE" dirty="0"/>
+                    </a:p>
+                  </a:txBody>
+                  <a:tcPr/>
+                </a:tc>
+                <a:tc>
+                  <a:txBody>
+                    <a:bodyPr/>
+                    <a:lstStyle/>
+                    <a:p>
+                      <a:r>
+                        <a:rPr lang="en-US" dirty="0"/>
+                        <a:t>Restaurant Name</a:t>
+                      </a:r>
+                      <a:endParaRPr lang="en-AE" dirty="0"/>
+                    </a:p>
+                  </a:txBody>
+                  <a:tcPr/>
+                </a:tc>
+                <a:tc>
+                  <a:txBody>
+                    <a:bodyPr/>
+                    <a:lstStyle/>
+                    <a:p>
+                      <a:r>
+                        <a:rPr lang="en-US" dirty="0"/>
+                        <a:t>Street Address</a:t>
+                      </a:r>
+                      <a:endParaRPr lang="en-AE" dirty="0"/>
+                    </a:p>
+                  </a:txBody>
+                  <a:tcPr/>
+                </a:tc>
+                <a:tc>
+                  <a:txBody>
+                    <a:bodyPr/>
+                    <a:lstStyle/>
+                    <a:p>
+                      <a:r>
+                        <a:rPr lang="en-US" dirty="0" err="1"/>
+                        <a:t>GlobalID</a:t>
+                      </a:r>
+                      <a:endParaRPr lang="en-AE" dirty="0"/>
+                    </a:p>
+                  </a:txBody>
+                  <a:tcPr/>
+                </a:tc>
+                <a:extLst>
+                  <a:ext uri="{0D108BD9-81ED-4DB2-BD59-A6C34878D82A}">
+                    <a16:rowId xmlns:a16="http://schemas.microsoft.com/office/drawing/2014/main" val="130945692"/>
+                  </a:ext>
+                </a:extLst>
+              </a:tr>
+              <a:tr h="195858">
+                <a:tc>
+                  <a:txBody>
+                    <a:bodyPr/>
+                    <a:lstStyle/>
+                    <a:p>
+                      <a:r>
+                        <a:rPr lang="en-US" dirty="0"/>
+                        <a:t>XYZ123</a:t>
+                      </a:r>
+                      <a:endParaRPr lang="en-AE" dirty="0"/>
+                    </a:p>
+                  </a:txBody>
+                  <a:tcPr/>
+                </a:tc>
+                <a:tc>
+                  <a:txBody>
+                    <a:bodyPr/>
+                    <a:lstStyle/>
+                    <a:p>
+                      <a:r>
+                        <a:rPr lang="en-US" dirty="0" err="1"/>
+                        <a:t>McD</a:t>
+                      </a:r>
+                      <a:endParaRPr lang="en-AE" dirty="0"/>
+                    </a:p>
+                  </a:txBody>
+                  <a:tcPr/>
+                </a:tc>
+                <a:tc>
+                  <a:txBody>
+                    <a:bodyPr/>
+                    <a:lstStyle/>
+                    <a:p>
+                      <a:r>
+                        <a:rPr lang="en-US" dirty="0"/>
+                        <a:t>1 Street</a:t>
+                      </a:r>
+                      <a:endParaRPr lang="en-AE" dirty="0"/>
+                    </a:p>
+                  </a:txBody>
+                  <a:tcPr/>
+                </a:tc>
+                <a:tc>
+                  <a:txBody>
+                    <a:bodyPr/>
+                    <a:lstStyle/>
+                    <a:p>
+                      <a:r>
+                        <a:rPr lang="en-US" dirty="0"/>
+                        <a:t>1</a:t>
+                      </a:r>
+                      <a:endParaRPr lang="en-AE" dirty="0"/>
+                    </a:p>
+                  </a:txBody>
+                  <a:tcPr/>
+                </a:tc>
+                <a:extLst>
+                  <a:ext uri="{0D108BD9-81ED-4DB2-BD59-A6C34878D82A}">
+                    <a16:rowId xmlns:a16="http://schemas.microsoft.com/office/drawing/2014/main" val="3550150490"/>
+                  </a:ext>
+                </a:extLst>
+              </a:tr>
+              <a:tr h="342751">
+                <a:tc>
+                  <a:txBody>
+                    <a:bodyPr/>
+                    <a:lstStyle/>
+                    <a:p>
+                      <a:r>
+                        <a:rPr lang="en-US" dirty="0"/>
+                        <a:t>XYZ124</a:t>
+                      </a:r>
+                      <a:endParaRPr lang="en-AE" dirty="0"/>
+                    </a:p>
+                  </a:txBody>
+                  <a:tcPr/>
+                </a:tc>
+                <a:tc>
+                  <a:txBody>
+                    <a:bodyPr/>
+                    <a:lstStyle/>
+                    <a:p>
+                      <a:r>
+                        <a:rPr lang="en-US" dirty="0"/>
+                        <a:t>Saucepan</a:t>
+                      </a:r>
+                      <a:endParaRPr lang="en-AE" dirty="0"/>
+                    </a:p>
+                  </a:txBody>
+                  <a:tcPr/>
+                </a:tc>
+                <a:tc>
+                  <a:txBody>
+                    <a:bodyPr/>
+                    <a:lstStyle/>
+                    <a:p>
+                      <a:r>
+                        <a:rPr lang="en-US" dirty="0"/>
+                        <a:t>1 Street</a:t>
+                      </a:r>
+                      <a:endParaRPr lang="en-AE" dirty="0"/>
+                    </a:p>
+                  </a:txBody>
+                  <a:tcPr/>
+                </a:tc>
+                <a:tc>
+                  <a:txBody>
+                    <a:bodyPr/>
+                    <a:lstStyle/>
+                    <a:p>
+                      <a:r>
+                        <a:rPr lang="en-US" dirty="0"/>
+                        <a:t>2</a:t>
+                      </a:r>
+                      <a:endParaRPr lang="en-AE" dirty="0"/>
+                    </a:p>
+                  </a:txBody>
+                  <a:tcPr/>
+                </a:tc>
+                <a:extLst>
+                  <a:ext uri="{0D108BD9-81ED-4DB2-BD59-A6C34878D82A}">
+                    <a16:rowId xmlns:a16="http://schemas.microsoft.com/office/drawing/2014/main" val="2075380803"/>
+                  </a:ext>
+                </a:extLst>
+              </a:tr>
+              <a:tr h="195858">
+                <a:tc>
+                  <a:txBody>
+                    <a:bodyPr/>
+                    <a:lstStyle/>
+                    <a:p>
+                      <a:r>
+                        <a:rPr lang="en-US" dirty="0"/>
+                        <a:t>XYZ123</a:t>
+                      </a:r>
+                      <a:endParaRPr lang="en-AE" dirty="0"/>
+                    </a:p>
+                  </a:txBody>
+                  <a:tcPr/>
+                </a:tc>
+                <a:tc>
+                  <a:txBody>
+                    <a:bodyPr/>
+                    <a:lstStyle/>
+                    <a:p>
+                      <a:r>
+                        <a:rPr lang="en-US" dirty="0" err="1"/>
+                        <a:t>McD</a:t>
+                      </a:r>
+                      <a:endParaRPr lang="en-AE" dirty="0"/>
+                    </a:p>
+                  </a:txBody>
+                  <a:tcPr/>
+                </a:tc>
+                <a:tc>
+                  <a:txBody>
+                    <a:bodyPr/>
+                    <a:lstStyle/>
+                    <a:p>
+                      <a:r>
+                        <a:rPr lang="en-US" dirty="0"/>
+                        <a:t>1 Street</a:t>
+                      </a:r>
+                      <a:endParaRPr lang="en-AE" dirty="0"/>
+                    </a:p>
+                  </a:txBody>
+                  <a:tcPr/>
+                </a:tc>
+                <a:tc>
+                  <a:txBody>
+                    <a:bodyPr/>
+                    <a:lstStyle/>
+                    <a:p>
+                      <a:r>
+                        <a:rPr lang="en-US" dirty="0"/>
+                        <a:t>1</a:t>
+                      </a:r>
+                      <a:endParaRPr lang="en-AE" dirty="0"/>
+                    </a:p>
+                  </a:txBody>
+                  <a:tcPr/>
+                </a:tc>
+                <a:extLst>
+                  <a:ext uri="{0D108BD9-81ED-4DB2-BD59-A6C34878D82A}">
+                    <a16:rowId xmlns:a16="http://schemas.microsoft.com/office/drawing/2014/main" val="1175958155"/>
+                  </a:ext>
+                </a:extLst>
+              </a:tr>
+              <a:tr h="342751">
+                <a:tc>
+                  <a:txBody>
+                    <a:bodyPr/>
+                    <a:lstStyle/>
+                    <a:p>
+                      <a:r>
+                        <a:rPr lang="en-US" dirty="0"/>
+                        <a:t>XYZ126</a:t>
+                      </a:r>
+                      <a:endParaRPr lang="en-AE" dirty="0"/>
+                    </a:p>
+                  </a:txBody>
+                  <a:tcPr/>
+                </a:tc>
+                <a:tc>
+                  <a:txBody>
+                    <a:bodyPr/>
+                    <a:lstStyle/>
+                    <a:p>
+                      <a:r>
+                        <a:rPr lang="en-US" dirty="0" err="1"/>
+                        <a:t>Goodeats</a:t>
+                      </a:r>
+                      <a:endParaRPr lang="en-AE" dirty="0"/>
+                    </a:p>
+                  </a:txBody>
+                  <a:tcPr/>
+                </a:tc>
+                <a:tc>
+                  <a:txBody>
+                    <a:bodyPr/>
+                    <a:lstStyle/>
+                    <a:p>
+                      <a:r>
+                        <a:rPr lang="en-US" dirty="0"/>
+                        <a:t>2 Street</a:t>
+                      </a:r>
+                      <a:endParaRPr lang="en-AE" dirty="0"/>
+                    </a:p>
+                  </a:txBody>
+                  <a:tcPr/>
+                </a:tc>
+                <a:tc>
+                  <a:txBody>
+                    <a:bodyPr/>
+                    <a:lstStyle/>
+                    <a:p>
+                      <a:r>
+                        <a:rPr lang="en-US" dirty="0"/>
+                        <a:t>3</a:t>
+                      </a:r>
+                      <a:endParaRPr lang="en-AE" dirty="0"/>
+                    </a:p>
+                  </a:txBody>
+                  <a:tcPr/>
+                </a:tc>
+                <a:extLst>
+                  <a:ext uri="{0D108BD9-81ED-4DB2-BD59-A6C34878D82A}">
+                    <a16:rowId xmlns:a16="http://schemas.microsoft.com/office/drawing/2014/main" val="3316805304"/>
+                  </a:ext>
+                </a:extLst>
+              </a:tr>
+              <a:tr h="342751">
+                <a:tc>
+                  <a:txBody>
+                    <a:bodyPr/>
+                    <a:lstStyle/>
+                    <a:p>
+                      <a:r>
+                        <a:rPr lang="en-US" dirty="0"/>
+                        <a:t>XYZ127</a:t>
+                      </a:r>
+                      <a:endParaRPr lang="en-AE" dirty="0"/>
+                    </a:p>
+                  </a:txBody>
+                  <a:tcPr/>
+                </a:tc>
+                <a:tc>
+                  <a:txBody>
+                    <a:bodyPr/>
+                    <a:lstStyle/>
+                    <a:p>
+                      <a:r>
+                        <a:rPr lang="en-US" dirty="0"/>
+                        <a:t>Chinese Hut</a:t>
+                      </a:r>
+                      <a:endParaRPr lang="en-AE" dirty="0"/>
+                    </a:p>
+                  </a:txBody>
+                  <a:tcPr/>
+                </a:tc>
+                <a:tc>
+                  <a:txBody>
+                    <a:bodyPr/>
+                    <a:lstStyle/>
+                    <a:p>
+                      <a:r>
+                        <a:rPr lang="en-US" dirty="0"/>
+                        <a:t>3 Street</a:t>
+                      </a:r>
+                      <a:endParaRPr lang="en-AE" dirty="0"/>
+                    </a:p>
+                  </a:txBody>
+                  <a:tcPr/>
+                </a:tc>
+                <a:tc>
+                  <a:txBody>
+                    <a:bodyPr/>
+                    <a:lstStyle/>
+                    <a:p>
+                      <a:r>
+                        <a:rPr lang="en-US" dirty="0"/>
+                        <a:t>4</a:t>
+                      </a:r>
+                      <a:endParaRPr lang="en-AE" dirty="0"/>
+                    </a:p>
+                  </a:txBody>
+                  <a:tcPr/>
+                </a:tc>
+                <a:extLst>
+                  <a:ext uri="{0D108BD9-81ED-4DB2-BD59-A6C34878D82A}">
+                    <a16:rowId xmlns:a16="http://schemas.microsoft.com/office/drawing/2014/main" val="3100583042"/>
+                  </a:ext>
+                </a:extLst>
+              </a:tr>
+              <a:tr h="342751">
+                <a:tc>
+                  <a:txBody>
+                    <a:bodyPr/>
+                    <a:lstStyle/>
+                    <a:p>
+                      <a:r>
+                        <a:rPr lang="en-US" dirty="0"/>
+                        <a:t>XYZ128</a:t>
+                      </a:r>
+                      <a:endParaRPr lang="en-AE" dirty="0"/>
+                    </a:p>
+                  </a:txBody>
+                  <a:tcPr/>
+                </a:tc>
+                <a:tc>
+                  <a:txBody>
+                    <a:bodyPr/>
+                    <a:lstStyle/>
+                    <a:p>
+                      <a:r>
+                        <a:rPr lang="en-US" dirty="0"/>
+                        <a:t>Pizza Heaven</a:t>
+                      </a:r>
+                      <a:endParaRPr lang="en-AE" dirty="0"/>
+                    </a:p>
+                  </a:txBody>
+                  <a:tcPr/>
+                </a:tc>
+                <a:tc>
+                  <a:txBody>
+                    <a:bodyPr/>
+                    <a:lstStyle/>
+                    <a:p>
+                      <a:r>
+                        <a:rPr lang="en-US" dirty="0"/>
+                        <a:t>2 Street</a:t>
+                      </a:r>
+                      <a:endParaRPr lang="en-AE" dirty="0"/>
+                    </a:p>
+                  </a:txBody>
+                  <a:tcPr/>
+                </a:tc>
+                <a:tc>
+                  <a:txBody>
+                    <a:bodyPr/>
+                    <a:lstStyle/>
+                    <a:p>
+                      <a:r>
+                        <a:rPr lang="en-US" dirty="0"/>
+                        <a:t>5</a:t>
+                      </a:r>
+                      <a:endParaRPr lang="en-AE" dirty="0"/>
+                    </a:p>
+                  </a:txBody>
+                  <a:tcPr/>
+                </a:tc>
+                <a:extLst>
+                  <a:ext uri="{0D108BD9-81ED-4DB2-BD59-A6C34878D82A}">
+                    <a16:rowId xmlns:a16="http://schemas.microsoft.com/office/drawing/2014/main" val="1433070935"/>
+                  </a:ext>
+                </a:extLst>
+              </a:tr>
+              <a:tr h="195858">
+                <a:tc>
+                  <a:txBody>
+                    <a:bodyPr/>
+                    <a:lstStyle/>
+                    <a:p>
+                      <a:r>
+                        <a:rPr lang="en-US" dirty="0"/>
+                        <a:t>XYZ123</a:t>
+                      </a:r>
+                      <a:endParaRPr lang="en-AE" dirty="0"/>
+                    </a:p>
+                  </a:txBody>
+                  <a:tcPr/>
+                </a:tc>
+                <a:tc>
+                  <a:txBody>
+                    <a:bodyPr/>
+                    <a:lstStyle/>
+                    <a:p>
+                      <a:r>
+                        <a:rPr lang="en-US" dirty="0" err="1"/>
+                        <a:t>McD</a:t>
+                      </a:r>
+                      <a:endParaRPr lang="en-AE" dirty="0"/>
+                    </a:p>
+                  </a:txBody>
+                  <a:tcPr/>
+                </a:tc>
+                <a:tc>
+                  <a:txBody>
+                    <a:bodyPr/>
+                    <a:lstStyle/>
+                    <a:p>
+                      <a:r>
+                        <a:rPr lang="en-US" dirty="0"/>
+                        <a:t>1 Street</a:t>
+                      </a:r>
+                      <a:endParaRPr lang="en-AE" dirty="0"/>
+                    </a:p>
+                  </a:txBody>
+                  <a:tcPr/>
+                </a:tc>
+                <a:tc>
+                  <a:txBody>
+                    <a:bodyPr/>
+                    <a:lstStyle/>
+                    <a:p>
+                      <a:r>
+                        <a:rPr lang="en-US" dirty="0"/>
+                        <a:t>1</a:t>
+                      </a:r>
+                      <a:endParaRPr lang="en-AE" dirty="0"/>
+                    </a:p>
+                  </a:txBody>
+                  <a:tcPr/>
+                </a:tc>
+                <a:extLst>
+                  <a:ext uri="{0D108BD9-81ED-4DB2-BD59-A6C34878D82A}">
+                    <a16:rowId xmlns:a16="http://schemas.microsoft.com/office/drawing/2014/main" val="1974913840"/>
+                  </a:ext>
+                </a:extLst>
+              </a:tr>
+            </a:tbl>
+          </a:graphicData>
+        </a:graphic>
+      </p:graphicFrame>
+    </p:spTree>
+    <p:extLst>
+      <p:ext uri="{BB962C8B-B14F-4D97-AF65-F5344CB8AC3E}">
+        <p14:creationId xmlns:p14="http://schemas.microsoft.com/office/powerpoint/2010/main" val="2460480122"/>
+      </p:ext>
+    </p:extLst>
+  </p:cSld>
+  <p:clrMapOvr>
+    <a:masterClrMapping/>
+  </p:clrMapOvr>
+</p:sld>
+</file>
+
 <file path=ppt/theme/theme1.xml><?xml version="1.0" encoding="utf-8"?>
 <a:theme xmlns:a="http://schemas.openxmlformats.org/drawingml/2006/main" name="Office Theme">
   <a:themeElements>

</xml_diff>

<commit_message>
Added more issues to fix in ppt
</commit_message>
<xml_diff>
--- a/ETH_Project 1.pptx
+++ b/ETH_Project 1.pptx
@@ -138,7 +138,7 @@
   <pc:docChgLst>
     <pc:chgData name="Prateek Shekhar" userId="02bf5c052f0ff66a" providerId="LiveId" clId="{B80EAAFD-2A40-4B96-9983-E6508BCC74ED}"/>
     <pc:docChg chg="undo custSel addSld delSld modSld">
-      <pc:chgData name="Prateek Shekhar" userId="02bf5c052f0ff66a" providerId="LiveId" clId="{B80EAAFD-2A40-4B96-9983-E6508BCC74ED}" dt="2024-01-21T13:46:57.512" v="9893" actId="20577"/>
+      <pc:chgData name="Prateek Shekhar" userId="02bf5c052f0ff66a" providerId="LiveId" clId="{B80EAAFD-2A40-4B96-9983-E6508BCC74ED}" dt="2024-01-22T19:33:40.651" v="10051" actId="20577"/>
       <pc:docMkLst>
         <pc:docMk/>
       </pc:docMkLst>
@@ -861,7 +861,7 @@
         </pc:spChg>
       </pc:sldChg>
       <pc:sldChg chg="modSp new mod">
-        <pc:chgData name="Prateek Shekhar" userId="02bf5c052f0ff66a" providerId="LiveId" clId="{B80EAAFD-2A40-4B96-9983-E6508BCC74ED}" dt="2024-01-21T13:46:57.512" v="9893" actId="20577"/>
+        <pc:chgData name="Prateek Shekhar" userId="02bf5c052f0ff66a" providerId="LiveId" clId="{B80EAAFD-2A40-4B96-9983-E6508BCC74ED}" dt="2024-01-22T19:33:40.651" v="10051" actId="20577"/>
         <pc:sldMkLst>
           <pc:docMk/>
           <pc:sldMk cId="2864596118" sldId="270"/>
@@ -875,7 +875,7 @@
           </ac:spMkLst>
         </pc:spChg>
         <pc:spChg chg="mod">
-          <ac:chgData name="Prateek Shekhar" userId="02bf5c052f0ff66a" providerId="LiveId" clId="{B80EAAFD-2A40-4B96-9983-E6508BCC74ED}" dt="2024-01-21T13:46:57.512" v="9893" actId="20577"/>
+          <ac:chgData name="Prateek Shekhar" userId="02bf5c052f0ff66a" providerId="LiveId" clId="{B80EAAFD-2A40-4B96-9983-E6508BCC74ED}" dt="2024-01-22T19:33:40.651" v="10051" actId="20577"/>
           <ac:spMkLst>
             <pc:docMk/>
             <pc:sldMk cId="2864596118" sldId="270"/>
@@ -1199,7 +1199,7 @@
           <a:p>
             <a:fld id="{6EAEE6A6-CED2-46BC-AD70-1FD03213DDC0}" type="datetimeFigureOut">
               <a:rPr lang="en-AE" smtClean="0"/>
-              <a:t>21/01/2024</a:t>
+              <a:t>22/01/2024</a:t>
             </a:fld>
             <a:endParaRPr lang="en-AE"/>
           </a:p>
@@ -1399,7 +1399,7 @@
           <a:p>
             <a:fld id="{6EAEE6A6-CED2-46BC-AD70-1FD03213DDC0}" type="datetimeFigureOut">
               <a:rPr lang="en-AE" smtClean="0"/>
-              <a:t>21/01/2024</a:t>
+              <a:t>22/01/2024</a:t>
             </a:fld>
             <a:endParaRPr lang="en-AE"/>
           </a:p>
@@ -1609,7 +1609,7 @@
           <a:p>
             <a:fld id="{6EAEE6A6-CED2-46BC-AD70-1FD03213DDC0}" type="datetimeFigureOut">
               <a:rPr lang="en-AE" smtClean="0"/>
-              <a:t>21/01/2024</a:t>
+              <a:t>22/01/2024</a:t>
             </a:fld>
             <a:endParaRPr lang="en-AE"/>
           </a:p>
@@ -1809,7 +1809,7 @@
           <a:p>
             <a:fld id="{6EAEE6A6-CED2-46BC-AD70-1FD03213DDC0}" type="datetimeFigureOut">
               <a:rPr lang="en-AE" smtClean="0"/>
-              <a:t>21/01/2024</a:t>
+              <a:t>22/01/2024</a:t>
             </a:fld>
             <a:endParaRPr lang="en-AE"/>
           </a:p>
@@ -2085,7 +2085,7 @@
           <a:p>
             <a:fld id="{6EAEE6A6-CED2-46BC-AD70-1FD03213DDC0}" type="datetimeFigureOut">
               <a:rPr lang="en-AE" smtClean="0"/>
-              <a:t>21/01/2024</a:t>
+              <a:t>22/01/2024</a:t>
             </a:fld>
             <a:endParaRPr lang="en-AE"/>
           </a:p>
@@ -2353,7 +2353,7 @@
           <a:p>
             <a:fld id="{6EAEE6A6-CED2-46BC-AD70-1FD03213DDC0}" type="datetimeFigureOut">
               <a:rPr lang="en-AE" smtClean="0"/>
-              <a:t>21/01/2024</a:t>
+              <a:t>22/01/2024</a:t>
             </a:fld>
             <a:endParaRPr lang="en-AE"/>
           </a:p>
@@ -2768,7 +2768,7 @@
           <a:p>
             <a:fld id="{6EAEE6A6-CED2-46BC-AD70-1FD03213DDC0}" type="datetimeFigureOut">
               <a:rPr lang="en-AE" smtClean="0"/>
-              <a:t>21/01/2024</a:t>
+              <a:t>22/01/2024</a:t>
             </a:fld>
             <a:endParaRPr lang="en-AE"/>
           </a:p>
@@ -2910,7 +2910,7 @@
           <a:p>
             <a:fld id="{6EAEE6A6-CED2-46BC-AD70-1FD03213DDC0}" type="datetimeFigureOut">
               <a:rPr lang="en-AE" smtClean="0"/>
-              <a:t>21/01/2024</a:t>
+              <a:t>22/01/2024</a:t>
             </a:fld>
             <a:endParaRPr lang="en-AE"/>
           </a:p>
@@ -3023,7 +3023,7 @@
           <a:p>
             <a:fld id="{6EAEE6A6-CED2-46BC-AD70-1FD03213DDC0}" type="datetimeFigureOut">
               <a:rPr lang="en-AE" smtClean="0"/>
-              <a:t>21/01/2024</a:t>
+              <a:t>22/01/2024</a:t>
             </a:fld>
             <a:endParaRPr lang="en-AE"/>
           </a:p>
@@ -3336,7 +3336,7 @@
           <a:p>
             <a:fld id="{6EAEE6A6-CED2-46BC-AD70-1FD03213DDC0}" type="datetimeFigureOut">
               <a:rPr lang="en-AE" smtClean="0"/>
-              <a:t>21/01/2024</a:t>
+              <a:t>22/01/2024</a:t>
             </a:fld>
             <a:endParaRPr lang="en-AE"/>
           </a:p>
@@ -3625,7 +3625,7 @@
           <a:p>
             <a:fld id="{6EAEE6A6-CED2-46BC-AD70-1FD03213DDC0}" type="datetimeFigureOut">
               <a:rPr lang="en-AE" smtClean="0"/>
-              <a:t>21/01/2024</a:t>
+              <a:t>22/01/2024</a:t>
             </a:fld>
             <a:endParaRPr lang="en-AE"/>
           </a:p>
@@ -3868,7 +3868,7 @@
           <a:p>
             <a:fld id="{6EAEE6A6-CED2-46BC-AD70-1FD03213DDC0}" type="datetimeFigureOut">
               <a:rPr lang="en-AE" smtClean="0"/>
-              <a:t>21/01/2024</a:t>
+              <a:t>22/01/2024</a:t>
             </a:fld>
             <a:endParaRPr lang="en-AE"/>
           </a:p>
@@ -5803,11 +5803,23 @@
           <a:p>
             <a:r>
               <a:rPr lang="en-US" dirty="0"/>
-              <a:t>The function to present the latest inspection row in the DOHMH </a:t>
+              <a:t>The function to present the latest inspection row in the DOHMH table doesn’t work.</a:t>
+            </a:r>
+          </a:p>
+          <a:p>
+            <a:r>
+              <a:rPr lang="en-US" dirty="0"/>
+              <a:t>My OLAP model doesn’t seem to fit satisfactorily with the data.</a:t>
+            </a:r>
+          </a:p>
+          <a:p>
+            <a:r>
+              <a:rPr lang="en-US" dirty="0"/>
+              <a:t>I might have to create a separate database for the </a:t>
             </a:r>
             <a:r>
               <a:rPr lang="en-US"/>
-              <a:t>table doesn’t work.</a:t>
+              <a:t>scraped data.</a:t>
             </a:r>
             <a:endParaRPr lang="en-AE"/>
           </a:p>

</xml_diff>